<commit_message>
updated script to run whole workflow
</commit_message>
<xml_diff>
--- a/PROJECTS/SLR - semantic keywords for systematic literature reviews - NieLeniweProjekty/final presentation 1/NLP - final presentation.pptx
+++ b/PROJECTS/SLR - semantic keywords for systematic literature reviews - NieLeniweProjekty/final presentation 1/NLP - final presentation.pptx
@@ -2739,7 +2739,7 @@
           <a:p>
             <a:fld id="{F98AA868-8872-43E4-8C98-D34DABD1FD38}" type="datetimeFigureOut">
               <a:rPr lang="pl-PL" smtClean="0"/>
-              <a:t>04.01.2023</a:t>
+              <a:t>13.01.2023</a:t>
             </a:fld>
             <a:endParaRPr lang="pl-PL"/>
           </a:p>
@@ -2907,7 +2907,7 @@
           <a:p>
             <a:fld id="{F98AA868-8872-43E4-8C98-D34DABD1FD38}" type="datetimeFigureOut">
               <a:rPr lang="pl-PL" smtClean="0"/>
-              <a:t>04.01.2023</a:t>
+              <a:t>13.01.2023</a:t>
             </a:fld>
             <a:endParaRPr lang="pl-PL"/>
           </a:p>
@@ -3085,7 +3085,7 @@
           <a:p>
             <a:fld id="{F98AA868-8872-43E4-8C98-D34DABD1FD38}" type="datetimeFigureOut">
               <a:rPr lang="pl-PL" smtClean="0"/>
-              <a:t>04.01.2023</a:t>
+              <a:t>13.01.2023</a:t>
             </a:fld>
             <a:endParaRPr lang="pl-PL"/>
           </a:p>
@@ -6387,7 +6387,7 @@
           </a:prstGeom>
           <a:extLst>
             <a:ext uri="{C572A759-6A51-4108-AA02-DFA0A04FC94B}">
-              <ma14:wrappingTextBoxFlag xmlns="" xmlns:ma14="http://schemas.microsoft.com/office/mac/drawingml/2011/main" val="1"/>
+              <ma14:wrappingTextBoxFlag xmlns:ma14="http://schemas.microsoft.com/office/mac/drawingml/2011/main" xmlns="" val="1"/>
             </a:ext>
           </a:extLst>
         </p:spPr>
@@ -6685,7 +6685,7 @@
           <a:p>
             <a:fld id="{F98AA868-8872-43E4-8C98-D34DABD1FD38}" type="datetimeFigureOut">
               <a:rPr lang="pl-PL" smtClean="0"/>
-              <a:t>04.01.2023</a:t>
+              <a:t>13.01.2023</a:t>
             </a:fld>
             <a:endParaRPr lang="pl-PL"/>
           </a:p>
@@ -7902,7 +7902,7 @@
           </a:prstGeom>
           <a:extLst>
             <a:ext uri="{C572A759-6A51-4108-AA02-DFA0A04FC94B}">
-              <ma14:wrappingTextBoxFlag xmlns="" xmlns:ma14="http://schemas.microsoft.com/office/mac/drawingml/2011/main" val="1"/>
+              <ma14:wrappingTextBoxFlag xmlns:ma14="http://schemas.microsoft.com/office/mac/drawingml/2011/main" xmlns="" val="1"/>
             </a:ext>
           </a:extLst>
         </p:spPr>
@@ -9249,7 +9249,7 @@
           </a:prstGeom>
           <a:extLst>
             <a:ext uri="{C572A759-6A51-4108-AA02-DFA0A04FC94B}">
-              <ma14:wrappingTextBoxFlag xmlns="" xmlns:ma14="http://schemas.microsoft.com/office/mac/drawingml/2011/main" val="1"/>
+              <ma14:wrappingTextBoxFlag xmlns:ma14="http://schemas.microsoft.com/office/mac/drawingml/2011/main" xmlns="" val="1"/>
             </a:ext>
           </a:extLst>
         </p:spPr>
@@ -10626,7 +10626,7 @@
           </a:prstGeom>
           <a:extLst>
             <a:ext uri="{C572A759-6A51-4108-AA02-DFA0A04FC94B}">
-              <ma14:wrappingTextBoxFlag xmlns="" xmlns:ma14="http://schemas.microsoft.com/office/mac/drawingml/2011/main" val="1"/>
+              <ma14:wrappingTextBoxFlag xmlns:ma14="http://schemas.microsoft.com/office/mac/drawingml/2011/main" xmlns="" val="1"/>
             </a:ext>
           </a:extLst>
         </p:spPr>
@@ -10971,7 +10971,7 @@
           </a:prstGeom>
           <a:extLst>
             <a:ext uri="{C572A759-6A51-4108-AA02-DFA0A04FC94B}">
-              <ma14:wrappingTextBoxFlag xmlns="" xmlns:ma14="http://schemas.microsoft.com/office/mac/drawingml/2011/main" val="1"/>
+              <ma14:wrappingTextBoxFlag xmlns:ma14="http://schemas.microsoft.com/office/mac/drawingml/2011/main" xmlns="" val="1"/>
             </a:ext>
           </a:extLst>
         </p:spPr>
@@ -11260,7 +11260,7 @@
           </a:prstGeom>
           <a:extLst>
             <a:ext uri="{C572A759-6A51-4108-AA02-DFA0A04FC94B}">
-              <ma14:wrappingTextBoxFlag xmlns="" xmlns:ma14="http://schemas.microsoft.com/office/mac/drawingml/2011/main" val="1"/>
+              <ma14:wrappingTextBoxFlag xmlns:ma14="http://schemas.microsoft.com/office/mac/drawingml/2011/main" xmlns="" val="1"/>
             </a:ext>
           </a:extLst>
         </p:spPr>
@@ -11661,7 +11661,7 @@
           </a:prstGeom>
           <a:extLst>
             <a:ext uri="{C572A759-6A51-4108-AA02-DFA0A04FC94B}">
-              <ma14:wrappingTextBoxFlag xmlns="" xmlns:ma14="http://schemas.microsoft.com/office/mac/drawingml/2011/main" val="1"/>
+              <ma14:wrappingTextBoxFlag xmlns:ma14="http://schemas.microsoft.com/office/mac/drawingml/2011/main" xmlns="" val="1"/>
             </a:ext>
           </a:extLst>
         </p:spPr>
@@ -12062,7 +12062,7 @@
           </a:prstGeom>
           <a:extLst>
             <a:ext uri="{C572A759-6A51-4108-AA02-DFA0A04FC94B}">
-              <ma14:wrappingTextBoxFlag xmlns="" xmlns:ma14="http://schemas.microsoft.com/office/mac/drawingml/2011/main" val="1"/>
+              <ma14:wrappingTextBoxFlag xmlns:ma14="http://schemas.microsoft.com/office/mac/drawingml/2011/main" xmlns="" val="1"/>
             </a:ext>
           </a:extLst>
         </p:spPr>
@@ -12379,7 +12379,7 @@
           </a:prstGeom>
           <a:extLst>
             <a:ext uri="{C572A759-6A51-4108-AA02-DFA0A04FC94B}">
-              <ma14:wrappingTextBoxFlag xmlns="" xmlns:ma14="http://schemas.microsoft.com/office/mac/drawingml/2011/main" val="1"/>
+              <ma14:wrappingTextBoxFlag xmlns:ma14="http://schemas.microsoft.com/office/mac/drawingml/2011/main" xmlns="" val="1"/>
             </a:ext>
           </a:extLst>
         </p:spPr>
@@ -12712,7 +12712,7 @@
           </a:prstGeom>
           <a:extLst>
             <a:ext uri="{C572A759-6A51-4108-AA02-DFA0A04FC94B}">
-              <ma14:wrappingTextBoxFlag xmlns="" xmlns:ma14="http://schemas.microsoft.com/office/mac/drawingml/2011/main" val="1"/>
+              <ma14:wrappingTextBoxFlag xmlns:ma14="http://schemas.microsoft.com/office/mac/drawingml/2011/main" xmlns="" val="1"/>
             </a:ext>
           </a:extLst>
         </p:spPr>
@@ -13077,7 +13077,7 @@
           <a:p>
             <a:fld id="{F98AA868-8872-43E4-8C98-D34DABD1FD38}" type="datetimeFigureOut">
               <a:rPr lang="pl-PL" smtClean="0"/>
-              <a:t>04.01.2023</a:t>
+              <a:t>13.01.2023</a:t>
             </a:fld>
             <a:endParaRPr lang="pl-PL"/>
           </a:p>
@@ -13306,7 +13306,7 @@
           <a:p>
             <a:fld id="{F98AA868-8872-43E4-8C98-D34DABD1FD38}" type="datetimeFigureOut">
               <a:rPr lang="pl-PL" smtClean="0"/>
-              <a:t>04.01.2023</a:t>
+              <a:t>13.01.2023</a:t>
             </a:fld>
             <a:endParaRPr lang="pl-PL"/>
           </a:p>
@@ -13670,7 +13670,7 @@
           <a:p>
             <a:fld id="{F98AA868-8872-43E4-8C98-D34DABD1FD38}" type="datetimeFigureOut">
               <a:rPr lang="pl-PL" smtClean="0"/>
-              <a:t>04.01.2023</a:t>
+              <a:t>13.01.2023</a:t>
             </a:fld>
             <a:endParaRPr lang="pl-PL"/>
           </a:p>
@@ -13787,7 +13787,7 @@
           <a:p>
             <a:fld id="{F98AA868-8872-43E4-8C98-D34DABD1FD38}" type="datetimeFigureOut">
               <a:rPr lang="pl-PL" smtClean="0"/>
-              <a:t>04.01.2023</a:t>
+              <a:t>13.01.2023</a:t>
             </a:fld>
             <a:endParaRPr lang="pl-PL"/>
           </a:p>
@@ -13882,7 +13882,7 @@
           <a:p>
             <a:fld id="{F98AA868-8872-43E4-8C98-D34DABD1FD38}" type="datetimeFigureOut">
               <a:rPr lang="pl-PL" smtClean="0"/>
-              <a:t>04.01.2023</a:t>
+              <a:t>13.01.2023</a:t>
             </a:fld>
             <a:endParaRPr lang="pl-PL"/>
           </a:p>
@@ -14157,7 +14157,7 @@
           <a:p>
             <a:fld id="{F98AA868-8872-43E4-8C98-D34DABD1FD38}" type="datetimeFigureOut">
               <a:rPr lang="pl-PL" smtClean="0"/>
-              <a:t>04.01.2023</a:t>
+              <a:t>13.01.2023</a:t>
             </a:fld>
             <a:endParaRPr lang="pl-PL"/>
           </a:p>
@@ -14409,7 +14409,7 @@
           <a:p>
             <a:fld id="{F98AA868-8872-43E4-8C98-D34DABD1FD38}" type="datetimeFigureOut">
               <a:rPr lang="pl-PL" smtClean="0"/>
-              <a:t>04.01.2023</a:t>
+              <a:t>13.01.2023</a:t>
             </a:fld>
             <a:endParaRPr lang="pl-PL"/>
           </a:p>
@@ -14620,7 +14620,7 @@
           <a:p>
             <a:fld id="{F98AA868-8872-43E4-8C98-D34DABD1FD38}" type="datetimeFigureOut">
               <a:rPr lang="pl-PL" smtClean="0"/>
-              <a:t>04.01.2023</a:t>
+              <a:t>13.01.2023</a:t>
             </a:fld>
             <a:endParaRPr lang="pl-PL"/>
           </a:p>
@@ -16365,13 +16365,13 @@
           <a:lstStyle/>
           <a:p>
             <a:r>
-              <a:rPr lang="en-GB" b="1">
+              <a:rPr lang="en-GB" b="1" dirty="0">
                 <a:latin typeface="Calibri Light"/>
                 <a:cs typeface="Calibri Light"/>
               </a:rPr>
               <a:t>SLR - semantic keywords for systematic literature reviews</a:t>
             </a:r>
-            <a:endParaRPr lang="pl-PL"/>
+            <a:endParaRPr lang="pl-PL" dirty="0"/>
           </a:p>
         </p:txBody>
       </p:sp>
@@ -16571,7 +16571,7 @@
               <a:buNone/>
             </a:pPr>
             <a:r>
-              <a:rPr lang="pl-PL" sz="2000">
+              <a:rPr lang="pl-PL" sz="2000" dirty="0">
                 <a:solidFill>
                   <a:srgbClr val="FFFFFF"/>
                 </a:solidFill>
@@ -16580,7 +16580,7 @@
               <a:t>Michał </a:t>
             </a:r>
             <a:r>
-              <a:rPr lang="pl-PL" sz="2000" err="1">
+              <a:rPr lang="pl-PL" sz="2000" dirty="0" err="1">
                 <a:solidFill>
                   <a:srgbClr val="FFFFFF"/>
                 </a:solidFill>
@@ -19981,348 +19981,345 @@
           <a:lstStyle/>
           <a:p>
             <a:r>
-              <a:rPr lang="pl-PL">
+              <a:rPr lang="pl-PL" dirty="0">
                 <a:cs typeface="Calibri"/>
               </a:rPr>
               <a:t>Project 1 </a:t>
             </a:r>
             <a:r>
-              <a:rPr lang="pl-PL" err="1">
+              <a:rPr lang="pl-PL" dirty="0" err="1">
                 <a:cs typeface="Calibri"/>
               </a:rPr>
               <a:t>extensions</a:t>
             </a:r>
             <a:r>
-              <a:rPr lang="pl-PL">
+              <a:rPr lang="pl-PL" dirty="0">
                 <a:cs typeface="Calibri"/>
               </a:rPr>
               <a:t> and </a:t>
             </a:r>
             <a:r>
-              <a:rPr lang="pl-PL" err="1">
+              <a:rPr lang="pl-PL" dirty="0" err="1">
                 <a:cs typeface="Calibri"/>
               </a:rPr>
               <a:t>further</a:t>
             </a:r>
             <a:r>
-              <a:rPr lang="pl-PL">
+              <a:rPr lang="pl-PL" dirty="0">
                 <a:cs typeface="Calibri"/>
               </a:rPr>
               <a:t> </a:t>
             </a:r>
             <a:r>
-              <a:rPr lang="pl-PL" err="1">
+              <a:rPr lang="pl-PL" dirty="0" err="1">
                 <a:cs typeface="Calibri"/>
               </a:rPr>
               <a:t>experimetns</a:t>
             </a:r>
             <a:r>
-              <a:rPr lang="pl-PL">
+              <a:rPr lang="pl-PL" dirty="0">
                 <a:cs typeface="Calibri"/>
               </a:rPr>
               <a:t>:</a:t>
             </a:r>
-            <a:endParaRPr lang="pl-PL" err="1">
+          </a:p>
+          <a:p>
+            <a:pPr lvl="2"/>
+            <a:r>
+              <a:rPr lang="pl-PL" dirty="0" err="1">
+                <a:cs typeface="Calibri"/>
+              </a:rPr>
+              <a:t>Disambiguation</a:t>
+            </a:r>
+            <a:r>
+              <a:rPr lang="pl-PL" dirty="0">
+                <a:cs typeface="Calibri"/>
+              </a:rPr>
+              <a:t> </a:t>
+            </a:r>
+            <a:r>
+              <a:rPr lang="pl-PL" dirty="0" err="1">
+                <a:cs typeface="Calibri"/>
+              </a:rPr>
+              <a:t>improvement</a:t>
+            </a:r>
+            <a:r>
+              <a:rPr lang="pl-PL" dirty="0">
+                <a:cs typeface="Calibri"/>
+              </a:rPr>
+              <a:t> (</a:t>
+            </a:r>
+            <a:r>
+              <a:rPr lang="pl-PL" dirty="0" err="1">
+                <a:cs typeface="Calibri"/>
+              </a:rPr>
+              <a:t>initial</a:t>
+            </a:r>
+            <a:r>
+              <a:rPr lang="pl-PL" dirty="0">
+                <a:cs typeface="Calibri"/>
+              </a:rPr>
+              <a:t> </a:t>
+            </a:r>
+            <a:r>
+              <a:rPr lang="pl-PL" dirty="0" err="1">
+                <a:cs typeface="Calibri"/>
+              </a:rPr>
+              <a:t>sorting</a:t>
+            </a:r>
+            <a:r>
+              <a:rPr lang="pl-PL" dirty="0">
+                <a:cs typeface="Calibri"/>
+              </a:rPr>
+              <a:t>)</a:t>
+            </a:r>
+          </a:p>
+          <a:p>
+            <a:pPr lvl="2"/>
+            <a:r>
+              <a:rPr lang="pl-PL" dirty="0" err="1">
+                <a:cs typeface="Calibri"/>
+              </a:rPr>
+              <a:t>Higher</a:t>
+            </a:r>
+            <a:r>
+              <a:rPr lang="pl-PL" dirty="0">
+                <a:cs typeface="Calibri"/>
+              </a:rPr>
+              <a:t> </a:t>
+            </a:r>
+            <a:r>
+              <a:rPr lang="pl-PL" dirty="0" err="1">
+                <a:cs typeface="Calibri"/>
+              </a:rPr>
+              <a:t>number</a:t>
+            </a:r>
+            <a:r>
+              <a:rPr lang="pl-PL" dirty="0">
+                <a:cs typeface="Calibri"/>
+              </a:rPr>
+              <a:t> of </a:t>
+            </a:r>
+            <a:r>
+              <a:rPr lang="pl-PL" dirty="0" err="1">
+                <a:cs typeface="Calibri"/>
+              </a:rPr>
+              <a:t>topics</a:t>
+            </a:r>
+            <a:r>
+              <a:rPr lang="pl-PL" dirty="0">
+                <a:cs typeface="Calibri"/>
+              </a:rPr>
+              <a:t>, </a:t>
+            </a:r>
+            <a:r>
+              <a:rPr lang="pl-PL" dirty="0" err="1">
+                <a:cs typeface="Calibri"/>
+              </a:rPr>
+              <a:t>more</a:t>
+            </a:r>
+            <a:r>
+              <a:rPr lang="pl-PL" dirty="0">
+                <a:cs typeface="Calibri"/>
+              </a:rPr>
+              <a:t> </a:t>
+            </a:r>
+            <a:r>
+              <a:rPr lang="pl-PL" dirty="0" err="1">
+                <a:cs typeface="Calibri"/>
+              </a:rPr>
+              <a:t>keywords</a:t>
+            </a:r>
+            <a:r>
+              <a:rPr lang="pl-PL" dirty="0">
+                <a:cs typeface="Calibri"/>
+              </a:rPr>
+              <a:t> for a </a:t>
+            </a:r>
+            <a:r>
+              <a:rPr lang="pl-PL" dirty="0" err="1">
+                <a:cs typeface="Calibri"/>
+              </a:rPr>
+              <a:t>given</a:t>
+            </a:r>
+            <a:r>
+              <a:rPr lang="pl-PL" dirty="0">
+                <a:cs typeface="Calibri"/>
+              </a:rPr>
+              <a:t> </a:t>
+            </a:r>
+            <a:r>
+              <a:rPr lang="pl-PL" dirty="0" err="1">
+                <a:cs typeface="Calibri"/>
+              </a:rPr>
+              <a:t>topic</a:t>
+            </a:r>
+            <a:endParaRPr lang="pl-PL" dirty="0">
               <a:cs typeface="Calibri"/>
             </a:endParaRPr>
           </a:p>
           <a:p>
             <a:pPr lvl="2"/>
             <a:r>
-              <a:rPr lang="pl-PL" err="1">
+              <a:rPr lang="pl-PL" dirty="0" err="1">
                 <a:cs typeface="Calibri"/>
               </a:rPr>
-              <a:t>Disambiguation</a:t>
-            </a:r>
-            <a:r>
-              <a:rPr lang="pl-PL">
+              <a:t>Considering</a:t>
+            </a:r>
+            <a:r>
+              <a:rPr lang="pl-PL" dirty="0">
                 <a:cs typeface="Calibri"/>
               </a:rPr>
               <a:t> </a:t>
             </a:r>
             <a:r>
-              <a:rPr lang="pl-PL" err="1">
+              <a:rPr lang="pl-PL" dirty="0" err="1">
                 <a:cs typeface="Calibri"/>
               </a:rPr>
-              <a:t>improvement</a:t>
-            </a:r>
-            <a:r>
-              <a:rPr lang="pl-PL">
+              <a:t>keywords</a:t>
+            </a:r>
+            <a:r>
+              <a:rPr lang="pl-PL" dirty="0">
                 <a:cs typeface="Calibri"/>
               </a:rPr>
-              <a:t> (</a:t>
-            </a:r>
-            <a:r>
-              <a:rPr lang="pl-PL" err="1">
+              <a:t> not </a:t>
+            </a:r>
+            <a:r>
+              <a:rPr lang="pl-PL" dirty="0" err="1">
                 <a:cs typeface="Calibri"/>
               </a:rPr>
-              <a:t>initial</a:t>
-            </a:r>
-            <a:r>
-              <a:rPr lang="pl-PL">
+              <a:t>only</a:t>
+            </a:r>
+            <a:r>
+              <a:rPr lang="pl-PL" dirty="0">
                 <a:cs typeface="Calibri"/>
               </a:rPr>
-              <a:t> </a:t>
-            </a:r>
-            <a:r>
-              <a:rPr lang="pl-PL" err="1">
+              <a:t> from </a:t>
+            </a:r>
+            <a:r>
+              <a:rPr lang="pl-PL" i="1" dirty="0">
                 <a:cs typeface="Calibri"/>
               </a:rPr>
-              <a:t>sorting</a:t>
-            </a:r>
-            <a:r>
-              <a:rPr lang="pl-PL">
+              <a:t>the </a:t>
+            </a:r>
+            <a:r>
+              <a:rPr lang="pl-PL" i="1" dirty="0" err="1">
                 <a:cs typeface="Calibri"/>
               </a:rPr>
-              <a:t>)</a:t>
-            </a:r>
-          </a:p>
-          <a:p>
-            <a:pPr lvl="2"/>
-            <a:r>
-              <a:rPr lang="pl-PL" err="1">
+              <a:t>best</a:t>
+            </a:r>
+            <a:r>
+              <a:rPr lang="pl-PL" dirty="0">
                 <a:cs typeface="Calibri"/>
               </a:rPr>
-              <a:t>Higher</a:t>
-            </a:r>
-            <a:r>
-              <a:rPr lang="pl-PL">
+              <a:t> </a:t>
+            </a:r>
+            <a:r>
+              <a:rPr lang="pl-PL" dirty="0" err="1">
                 <a:cs typeface="Calibri"/>
               </a:rPr>
-              <a:t> </a:t>
-            </a:r>
-            <a:r>
-              <a:rPr lang="pl-PL" err="1">
+              <a:t>topic</a:t>
+            </a:r>
+            <a:r>
+              <a:rPr lang="pl-PL" dirty="0">
                 <a:cs typeface="Calibri"/>
               </a:rPr>
-              <a:t>number</a:t>
-            </a:r>
-            <a:r>
-              <a:rPr lang="pl-PL">
+              <a:t> </a:t>
+            </a:r>
+          </a:p>
+          <a:p>
+            <a:r>
+              <a:rPr lang="pl-PL" dirty="0" err="1">
                 <a:cs typeface="Calibri"/>
               </a:rPr>
-              <a:t> of </a:t>
-            </a:r>
-            <a:r>
-              <a:rPr lang="pl-PL" err="1">
+              <a:t>Adding</a:t>
+            </a:r>
+            <a:r>
+              <a:rPr lang="pl-PL" dirty="0">
                 <a:cs typeface="Calibri"/>
               </a:rPr>
-              <a:t>topics</a:t>
-            </a:r>
-            <a:r>
-              <a:rPr lang="pl-PL">
+              <a:t> </a:t>
+            </a:r>
+            <a:r>
+              <a:rPr lang="pl-PL" dirty="0" err="1">
                 <a:cs typeface="Calibri"/>
               </a:rPr>
-              <a:t>, </a:t>
-            </a:r>
-            <a:r>
-              <a:rPr lang="pl-PL" err="1">
+              <a:t>paper</a:t>
+            </a:r>
+            <a:r>
+              <a:rPr lang="pl-PL" dirty="0">
                 <a:cs typeface="Calibri"/>
               </a:rPr>
-              <a:t>more</a:t>
-            </a:r>
-            <a:r>
-              <a:rPr lang="pl-PL">
+              <a:t> </a:t>
+            </a:r>
+            <a:r>
+              <a:rPr lang="pl-PL" dirty="0" err="1">
                 <a:cs typeface="Calibri"/>
               </a:rPr>
-              <a:t> </a:t>
-            </a:r>
-            <a:r>
-              <a:rPr lang="pl-PL" err="1">
+              <a:t>searching</a:t>
+            </a:r>
+            <a:r>
+              <a:rPr lang="pl-PL" dirty="0">
                 <a:cs typeface="Calibri"/>
               </a:rPr>
+              <a:t> </a:t>
+            </a:r>
+            <a:r>
+              <a:rPr lang="pl-PL" dirty="0" err="1">
+                <a:cs typeface="Calibri"/>
+              </a:rPr>
+              <a:t>based</a:t>
+            </a:r>
+            <a:r>
+              <a:rPr lang="pl-PL" dirty="0">
+                <a:cs typeface="Calibri"/>
+              </a:rPr>
+              <a:t> on </a:t>
+            </a:r>
+            <a:r>
+              <a:rPr lang="pl-PL" dirty="0" err="1">
+                <a:cs typeface="Calibri"/>
+              </a:rPr>
+              <a:t>user</a:t>
+            </a:r>
+            <a:r>
+              <a:rPr lang="pl-PL" dirty="0">
+                <a:cs typeface="Calibri"/>
+              </a:rPr>
+              <a:t> </a:t>
+            </a:r>
+            <a:r>
+              <a:rPr lang="pl-PL" dirty="0" err="1">
+                <a:cs typeface="Calibri"/>
+              </a:rPr>
+              <a:t>query</a:t>
+            </a:r>
+            <a:r>
+              <a:rPr lang="pl-PL" dirty="0">
+                <a:cs typeface="Calibri"/>
+              </a:rPr>
+              <a:t> and </a:t>
+            </a:r>
+            <a:r>
+              <a:rPr lang="pl-PL" dirty="0" err="1">
+                <a:cs typeface="Calibri"/>
+              </a:rPr>
+              <a:t>extracted</a:t>
+            </a:r>
+            <a:r>
+              <a:rPr lang="pl-PL" dirty="0">
+                <a:cs typeface="Calibri"/>
+              </a:rPr>
+              <a:t> </a:t>
+            </a:r>
+            <a:r>
+              <a:rPr lang="pl-PL" dirty="0" err="1">
+                <a:cs typeface="Calibri"/>
+              </a:rPr>
               <a:t>keywords</a:t>
             </a:r>
             <a:r>
-              <a:rPr lang="pl-PL">
-                <a:cs typeface="Calibri"/>
-              </a:rPr>
-              <a:t> for a </a:t>
-            </a:r>
-            <a:r>
-              <a:rPr lang="pl-PL" err="1">
-                <a:cs typeface="Calibri"/>
-              </a:rPr>
-              <a:t>given</a:t>
-            </a:r>
-            <a:r>
-              <a:rPr lang="pl-PL">
-                <a:cs typeface="Calibri"/>
-              </a:rPr>
-              <a:t> </a:t>
-            </a:r>
-            <a:r>
-              <a:rPr lang="pl-PL" err="1">
-                <a:cs typeface="Calibri"/>
-              </a:rPr>
-              <a:t>topic</a:t>
-            </a:r>
-            <a:endParaRPr lang="pl-PL">
-              <a:cs typeface="Calibri"/>
-            </a:endParaRPr>
-          </a:p>
-          <a:p>
-            <a:pPr lvl="2"/>
-            <a:r>
-              <a:rPr lang="pl-PL" err="1">
-                <a:cs typeface="Calibri"/>
-              </a:rPr>
-              <a:t>Considering</a:t>
-            </a:r>
-            <a:r>
-              <a:rPr lang="pl-PL">
-                <a:cs typeface="Calibri"/>
-              </a:rPr>
-              <a:t> </a:t>
-            </a:r>
-            <a:r>
-              <a:rPr lang="pl-PL" err="1">
-                <a:cs typeface="Calibri"/>
-              </a:rPr>
-              <a:t>keywords</a:t>
-            </a:r>
-            <a:r>
-              <a:rPr lang="pl-PL">
-                <a:cs typeface="Calibri"/>
-              </a:rPr>
-              <a:t> not </a:t>
-            </a:r>
-            <a:r>
-              <a:rPr lang="pl-PL" err="1">
-                <a:cs typeface="Calibri"/>
-              </a:rPr>
-              <a:t>only</a:t>
-            </a:r>
-            <a:r>
-              <a:rPr lang="pl-PL">
-                <a:cs typeface="Calibri"/>
-              </a:rPr>
-              <a:t> from </a:t>
-            </a:r>
-            <a:r>
-              <a:rPr lang="pl-PL" i="1">
-                <a:cs typeface="Calibri"/>
-              </a:rPr>
-              <a:t>the </a:t>
-            </a:r>
-            <a:r>
-              <a:rPr lang="pl-PL" i="1" err="1">
-                <a:cs typeface="Calibri"/>
-              </a:rPr>
-              <a:t>best</a:t>
-            </a:r>
-            <a:r>
-              <a:rPr lang="pl-PL">
-                <a:cs typeface="Calibri"/>
-              </a:rPr>
-              <a:t> </a:t>
-            </a:r>
-            <a:r>
-              <a:rPr lang="pl-PL" err="1">
-                <a:cs typeface="Calibri"/>
-              </a:rPr>
-              <a:t>topic</a:t>
-            </a:r>
-            <a:r>
-              <a:rPr lang="pl-PL">
-                <a:cs typeface="Calibri"/>
-              </a:rPr>
-              <a:t> </a:t>
-            </a:r>
-          </a:p>
-          <a:p>
-            <a:r>
-              <a:rPr lang="pl-PL" err="1">
-                <a:cs typeface="Calibri"/>
-              </a:rPr>
-              <a:t>Adding</a:t>
-            </a:r>
-            <a:r>
-              <a:rPr lang="pl-PL">
-                <a:cs typeface="Calibri"/>
-              </a:rPr>
-              <a:t> </a:t>
-            </a:r>
-            <a:r>
-              <a:rPr lang="pl-PL" err="1">
-                <a:cs typeface="Calibri"/>
-              </a:rPr>
-              <a:t>paper</a:t>
-            </a:r>
-            <a:r>
-              <a:rPr lang="pl-PL">
-                <a:cs typeface="Calibri"/>
-              </a:rPr>
-              <a:t> </a:t>
-            </a:r>
-            <a:r>
-              <a:rPr lang="pl-PL" err="1">
-                <a:cs typeface="Calibri"/>
-              </a:rPr>
-              <a:t>searching</a:t>
-            </a:r>
-            <a:r>
-              <a:rPr lang="pl-PL">
-                <a:cs typeface="Calibri"/>
-              </a:rPr>
-              <a:t> </a:t>
-            </a:r>
-            <a:r>
-              <a:rPr lang="pl-PL" err="1">
-                <a:cs typeface="Calibri"/>
-              </a:rPr>
-              <a:t>based</a:t>
-            </a:r>
-            <a:r>
-              <a:rPr lang="pl-PL">
-                <a:cs typeface="Calibri"/>
-              </a:rPr>
-              <a:t> on </a:t>
-            </a:r>
-            <a:r>
-              <a:rPr lang="pl-PL" err="1">
-                <a:cs typeface="Calibri"/>
-              </a:rPr>
-              <a:t>user</a:t>
-            </a:r>
-            <a:r>
-              <a:rPr lang="pl-PL">
-                <a:cs typeface="Calibri"/>
-              </a:rPr>
-              <a:t> </a:t>
-            </a:r>
-            <a:r>
-              <a:rPr lang="pl-PL" err="1">
-                <a:cs typeface="Calibri"/>
-              </a:rPr>
-              <a:t>query</a:t>
-            </a:r>
-            <a:r>
-              <a:rPr lang="pl-PL">
-                <a:cs typeface="Calibri"/>
-              </a:rPr>
-              <a:t> and </a:t>
-            </a:r>
-            <a:r>
-              <a:rPr lang="pl-PL" err="1">
-                <a:cs typeface="Calibri"/>
-              </a:rPr>
-              <a:t>extracted</a:t>
-            </a:r>
-            <a:r>
-              <a:rPr lang="pl-PL">
-                <a:cs typeface="Calibri"/>
-              </a:rPr>
-              <a:t> </a:t>
-            </a:r>
-            <a:r>
-              <a:rPr lang="pl-PL" err="1">
-                <a:cs typeface="Calibri"/>
-              </a:rPr>
-              <a:t>keywords</a:t>
-            </a:r>
-            <a:r>
-              <a:rPr lang="pl-PL">
+              <a:rPr lang="pl-PL" dirty="0">
                 <a:cs typeface="Calibri"/>
               </a:rPr>
               <a:t> </a:t>
@@ -20863,58 +20860,13 @@
           <a:p>
             <a:pPr algn="ctr"/>
             <a:r>
-              <a:rPr lang="pl-PL" sz="2800" err="1">
+              <a:rPr lang="pl-PL" sz="2800" dirty="0">
                 <a:solidFill>
                   <a:schemeClr val="tx1"/>
                 </a:solidFill>
                 <a:cs typeface="Calibri"/>
               </a:rPr>
-              <a:t>Articles</a:t>
-            </a:r>
-            <a:r>
-              <a:rPr lang="pl-PL" sz="2800">
-                <a:solidFill>
-                  <a:schemeClr val="tx1"/>
-                </a:solidFill>
-                <a:cs typeface="Calibri"/>
-              </a:rPr>
-              <a:t> (</a:t>
-            </a:r>
-            <a:r>
-              <a:rPr lang="pl-PL" sz="2800" err="1">
-                <a:solidFill>
-                  <a:schemeClr val="tx1"/>
-                </a:solidFill>
-                <a:cs typeface="Calibri"/>
-              </a:rPr>
-              <a:t>titles</a:t>
-            </a:r>
-            <a:r>
-              <a:rPr lang="pl-PL" sz="2800">
-                <a:solidFill>
-                  <a:schemeClr val="tx1"/>
-                </a:solidFill>
-                <a:cs typeface="Calibri"/>
-              </a:rPr>
-              <a:t> and </a:t>
-            </a:r>
-            <a:r>
-              <a:rPr lang="pl-PL" sz="2800" err="1">
-                <a:solidFill>
-                  <a:schemeClr val="tx1"/>
-                </a:solidFill>
-                <a:cs typeface="Calibri"/>
-              </a:rPr>
-              <a:t>abstracts</a:t>
-            </a:r>
-            <a:r>
-              <a:rPr lang="pl-PL" sz="2800">
-                <a:solidFill>
-                  <a:schemeClr val="tx1"/>
-                </a:solidFill>
-                <a:cs typeface="Calibri"/>
-              </a:rPr>
-              <a:t>)</a:t>
+              <a:t>Articles (titles and abstracts)</a:t>
             </a:r>
           </a:p>
         </p:txBody>
@@ -21048,33 +21000,26 @@
           <a:lstStyle/>
           <a:p>
             <a:r>
-              <a:rPr lang="en-GB" sz="2800" err="1">
+              <a:rPr lang="en-GB" sz="2800" dirty="0">
                 <a:latin typeface="Calibri"/>
                 <a:cs typeface="Calibri Light"/>
               </a:rPr>
-              <a:t>BERTopic</a:t>
-            </a:r>
-            <a:r>
-              <a:rPr lang="en-GB" sz="2800">
-                <a:latin typeface="Calibri"/>
-                <a:cs typeface="Calibri Light"/>
-              </a:rPr>
-              <a:t>, </a:t>
-            </a:r>
-            <a:endParaRPr lang="pl-PL" sz="2800">
+              <a:t>BERTopic, </a:t>
+            </a:r>
+            <a:endParaRPr lang="pl-PL" sz="2800" dirty="0">
               <a:latin typeface="Calibri"/>
               <a:cs typeface="Calibri" panose="020F0502020204030204"/>
             </a:endParaRPr>
           </a:p>
           <a:p>
             <a:r>
-              <a:rPr lang="en-GB" sz="2800">
+              <a:rPr lang="en-GB" sz="2800" dirty="0">
                 <a:latin typeface="Calibri"/>
                 <a:cs typeface="Calibri Light"/>
               </a:rPr>
               <a:t>LDA</a:t>
             </a:r>
-            <a:endParaRPr lang="pl-PL" sz="2800">
+            <a:endParaRPr lang="pl-PL" sz="2800" dirty="0">
               <a:latin typeface="Calibri"/>
               <a:ea typeface="+mn-lt"/>
               <a:cs typeface="+mn-lt"/>
@@ -21082,7 +21027,7 @@
           </a:p>
           <a:p>
             <a:pPr algn="l"/>
-            <a:endParaRPr lang="pl-PL" sz="2800">
+            <a:endParaRPr lang="pl-PL" sz="2800" dirty="0">
               <a:cs typeface="Calibri"/>
             </a:endParaRPr>
           </a:p>
@@ -21139,7 +21084,7 @@
           <a:p>
             <a:pPr algn="ctr"/>
             <a:r>
-              <a:rPr lang="pl-PL" sz="2800" err="1">
+              <a:rPr lang="pl-PL" sz="2800" dirty="0">
                 <a:solidFill>
                   <a:schemeClr val="tx1"/>
                 </a:solidFill>
@@ -21147,7 +21092,7 @@
               </a:rPr>
               <a:t>Keywords</a:t>
             </a:r>
-            <a:endParaRPr lang="pl-PL" err="1"/>
+            <a:endParaRPr lang="pl-PL" dirty="0"/>
           </a:p>
         </p:txBody>
       </p:sp>
@@ -21261,33 +21206,15 @@
           <a:p>
             <a:pPr algn="ctr"/>
             <a:r>
-              <a:rPr lang="pl-PL" sz="2800" err="1">
+              <a:rPr lang="pl-PL" sz="2800" dirty="0">
                 <a:solidFill>
                   <a:schemeClr val="tx1"/>
                 </a:solidFill>
                 <a:cs typeface="Calibri"/>
               </a:rPr>
-              <a:t>Concepts</a:t>
-            </a:r>
-            <a:r>
-              <a:rPr lang="pl-PL" sz="2800">
-                <a:solidFill>
-                  <a:schemeClr val="tx1"/>
-                </a:solidFill>
-                <a:cs typeface="Calibri"/>
-              </a:rPr>
-              <a:t> from </a:t>
-            </a:r>
-            <a:r>
-              <a:rPr lang="pl-PL" sz="2800" err="1">
-                <a:solidFill>
-                  <a:schemeClr val="tx1"/>
-                </a:solidFill>
-                <a:cs typeface="Calibri"/>
-              </a:rPr>
-              <a:t>ontologies</a:t>
-            </a:r>
-            <a:endParaRPr lang="pl-PL" err="1">
+              <a:t>Concepts from ontologies</a:t>
+            </a:r>
+            <a:endParaRPr lang="pl-PL" dirty="0">
               <a:solidFill>
                 <a:schemeClr val="tx1"/>
               </a:solidFill>
@@ -21366,8 +21293,8 @@
         </p:nvSpPr>
         <p:spPr>
           <a:xfrm>
-            <a:off x="400050" y="4829174"/>
-            <a:ext cx="3022600" cy="830997"/>
+            <a:off x="342901" y="4773249"/>
+            <a:ext cx="3022600" cy="461665"/>
           </a:xfrm>
           <a:prstGeom prst="rect">
             <a:avLst/>
@@ -21384,35 +21311,10 @@
           <a:lstStyle/>
           <a:p>
             <a:r>
-              <a:rPr lang="pl-PL" sz="2400" err="1">
+              <a:rPr lang="pl-PL" sz="2400" dirty="0">
                 <a:cs typeface="Calibri"/>
               </a:rPr>
-              <a:t>MedMentions</a:t>
-            </a:r>
-            <a:r>
-              <a:rPr lang="pl-PL" sz="2400">
-                <a:cs typeface="Calibri"/>
-              </a:rPr>
-              <a:t> </a:t>
-            </a:r>
-            <a:r>
-              <a:rPr lang="pl-PL" sz="2400">
-                <a:ea typeface="+mn-lt"/>
-                <a:cs typeface="+mn-lt"/>
-              </a:rPr>
-              <a:t>ST21pv </a:t>
-            </a:r>
-            <a:r>
-              <a:rPr lang="pl-PL" sz="2400" err="1">
-                <a:cs typeface="Calibri"/>
-              </a:rPr>
-              <a:t>dataset</a:t>
-            </a:r>
-            <a:r>
-              <a:rPr lang="pl-PL" sz="2400">
-                <a:cs typeface="Calibri"/>
-              </a:rPr>
-              <a:t> </a:t>
+              <a:t>MedMentions  </a:t>
             </a:r>
           </a:p>
         </p:txBody>
@@ -21449,20 +21351,11 @@
           <a:lstStyle/>
           <a:p>
             <a:r>
-              <a:rPr lang="pl-PL" sz="2400">
+              <a:rPr lang="pl-PL" sz="2400" dirty="0">
                 <a:cs typeface="Calibri"/>
               </a:rPr>
-              <a:t>UMLS </a:t>
-            </a:r>
-            <a:r>
-              <a:rPr lang="pl-PL" sz="2400" err="1">
-                <a:cs typeface="Calibri"/>
-              </a:rPr>
-              <a:t>ontologies</a:t>
-            </a:r>
-            <a:endParaRPr lang="pl-PL" sz="2400">
-              <a:cs typeface="Calibri"/>
-            </a:endParaRPr>
+              <a:t>UMLS ontologies</a:t>
+            </a:r>
           </a:p>
         </p:txBody>
       </p:sp>
@@ -22491,211 +22384,211 @@
           <a:lstStyle/>
           <a:p>
             <a:r>
-              <a:rPr lang="pl-PL" err="1"/>
+              <a:rPr lang="pl-PL" dirty="0" err="1"/>
               <a:t>Aim</a:t>
             </a:r>
             <a:r>
-              <a:rPr lang="pl-PL"/>
+              <a:rPr lang="pl-PL" dirty="0"/>
               <a:t>: </a:t>
             </a:r>
           </a:p>
           <a:p>
             <a:pPr lvl="1"/>
             <a:r>
-              <a:rPr lang="pl-PL" err="1"/>
+              <a:rPr lang="pl-PL" dirty="0" err="1"/>
               <a:t>extract</a:t>
             </a:r>
             <a:r>
-              <a:rPr lang="pl-PL"/>
-              <a:t> </a:t>
-            </a:r>
-            <a:r>
-              <a:rPr lang="pl-PL" err="1"/>
+              <a:rPr lang="pl-PL" dirty="0"/>
+              <a:t> </a:t>
+            </a:r>
+            <a:r>
+              <a:rPr lang="pl-PL" dirty="0" err="1"/>
               <a:t>topic</a:t>
             </a:r>
             <a:r>
-              <a:rPr lang="pl-PL"/>
+              <a:rPr lang="pl-PL" dirty="0"/>
               <a:t> for </a:t>
             </a:r>
             <a:r>
-              <a:rPr lang="pl-PL" err="1"/>
+              <a:rPr lang="pl-PL" dirty="0" err="1"/>
               <a:t>each</a:t>
             </a:r>
             <a:r>
-              <a:rPr lang="pl-PL"/>
-              <a:t> </a:t>
-            </a:r>
-            <a:r>
-              <a:rPr lang="pl-PL" err="1"/>
+              <a:rPr lang="pl-PL" dirty="0"/>
+              <a:t> </a:t>
+            </a:r>
+            <a:r>
+              <a:rPr lang="pl-PL" dirty="0" err="1"/>
               <a:t>document</a:t>
             </a:r>
-            <a:endParaRPr lang="pl-PL"/>
+            <a:endParaRPr lang="pl-PL" dirty="0"/>
           </a:p>
           <a:p>
             <a:pPr lvl="1"/>
             <a:r>
-              <a:rPr lang="pl-PL" err="1"/>
+              <a:rPr lang="pl-PL" dirty="0" err="1"/>
               <a:t>extract</a:t>
             </a:r>
             <a:r>
-              <a:rPr lang="pl-PL"/>
-              <a:t> </a:t>
-            </a:r>
-            <a:r>
-              <a:rPr lang="pl-PL" err="1"/>
+              <a:rPr lang="pl-PL" dirty="0"/>
+              <a:t> </a:t>
+            </a:r>
+            <a:r>
+              <a:rPr lang="pl-PL" dirty="0" err="1"/>
               <a:t>keywords</a:t>
             </a:r>
             <a:r>
-              <a:rPr lang="pl-PL"/>
+              <a:rPr lang="pl-PL" dirty="0"/>
               <a:t> for </a:t>
             </a:r>
             <a:r>
-              <a:rPr lang="pl-PL" err="1"/>
+              <a:rPr lang="pl-PL" dirty="0" err="1"/>
               <a:t>each</a:t>
             </a:r>
             <a:r>
-              <a:rPr lang="pl-PL"/>
-              <a:t> </a:t>
-            </a:r>
-            <a:r>
-              <a:rPr lang="pl-PL" err="1"/>
+              <a:rPr lang="pl-PL" dirty="0"/>
+              <a:t> </a:t>
+            </a:r>
+            <a:r>
+              <a:rPr lang="pl-PL" dirty="0" err="1"/>
               <a:t>topic</a:t>
             </a:r>
-            <a:endParaRPr lang="pl-PL"/>
+            <a:endParaRPr lang="pl-PL" dirty="0"/>
           </a:p>
           <a:p>
             <a:pPr marL="457200" lvl="1" indent="0">
               <a:buNone/>
             </a:pPr>
-            <a:endParaRPr lang="pl-PL"/>
-          </a:p>
-          <a:p>
-            <a:r>
-              <a:rPr lang="pl-PL"/>
+            <a:endParaRPr lang="pl-PL" dirty="0"/>
+          </a:p>
+          <a:p>
+            <a:r>
+              <a:rPr lang="pl-PL" dirty="0"/>
               <a:t>Data </a:t>
             </a:r>
             <a:r>
-              <a:rPr lang="pl-PL" err="1"/>
+              <a:rPr lang="pl-PL" dirty="0" err="1"/>
               <a:t>need</a:t>
             </a:r>
             <a:r>
-              <a:rPr lang="pl-PL"/>
+              <a:rPr lang="pl-PL" dirty="0"/>
               <a:t> to be </a:t>
             </a:r>
             <a:r>
-              <a:rPr lang="pl-PL" err="1"/>
+              <a:rPr lang="pl-PL" dirty="0" err="1"/>
               <a:t>preprocessed</a:t>
             </a:r>
             <a:r>
-              <a:rPr lang="pl-PL"/>
+              <a:rPr lang="pl-PL" dirty="0"/>
               <a:t> </a:t>
             </a:r>
           </a:p>
           <a:p>
             <a:pPr lvl="1"/>
             <a:r>
-              <a:rPr lang="pl-PL"/>
+              <a:rPr lang="pl-PL" dirty="0"/>
               <a:t>Stop </a:t>
             </a:r>
             <a:r>
-              <a:rPr lang="pl-PL" err="1"/>
+              <a:rPr lang="pl-PL" dirty="0" err="1"/>
               <a:t>words</a:t>
             </a:r>
             <a:r>
-              <a:rPr lang="pl-PL"/>
-              <a:t> </a:t>
-            </a:r>
-            <a:r>
-              <a:rPr lang="pl-PL" err="1"/>
+              <a:rPr lang="pl-PL" dirty="0"/>
+              <a:t> </a:t>
+            </a:r>
+            <a:r>
+              <a:rPr lang="pl-PL" dirty="0" err="1"/>
               <a:t>removal</a:t>
             </a:r>
             <a:r>
-              <a:rPr lang="pl-PL"/>
+              <a:rPr lang="pl-PL" dirty="0"/>
               <a:t> </a:t>
             </a:r>
           </a:p>
           <a:p>
             <a:pPr lvl="1"/>
             <a:r>
-              <a:rPr lang="pl-PL" err="1">
+              <a:rPr lang="pl-PL" dirty="0" err="1">
                 <a:cs typeface="Calibri"/>
               </a:rPr>
               <a:t>Stemming</a:t>
             </a:r>
             <a:r>
-              <a:rPr lang="pl-PL">
+              <a:rPr lang="pl-PL" dirty="0">
                 <a:cs typeface="Calibri"/>
               </a:rPr>
               <a:t> and </a:t>
             </a:r>
             <a:r>
-              <a:rPr lang="pl-PL" err="1">
+              <a:rPr lang="pl-PL" dirty="0" err="1">
                 <a:cs typeface="Calibri"/>
               </a:rPr>
               <a:t>lemmatization</a:t>
             </a:r>
-            <a:endParaRPr lang="pl-PL"/>
-          </a:p>
-          <a:p>
-            <a:r>
-              <a:rPr lang="pl-PL" err="1"/>
+            <a:endParaRPr lang="pl-PL" dirty="0"/>
+          </a:p>
+          <a:p>
+            <a:r>
+              <a:rPr lang="pl-PL" dirty="0" err="1"/>
               <a:t>Number</a:t>
             </a:r>
             <a:r>
-              <a:rPr lang="pl-PL"/>
+              <a:rPr lang="pl-PL" dirty="0"/>
               <a:t> of </a:t>
             </a:r>
             <a:r>
-              <a:rPr lang="pl-PL" err="1"/>
+              <a:rPr lang="pl-PL" dirty="0" err="1"/>
               <a:t>topic</a:t>
             </a:r>
             <a:r>
-              <a:rPr lang="pl-PL"/>
-              <a:t> </a:t>
-            </a:r>
-            <a:r>
-              <a:rPr lang="pl-PL" err="1"/>
+              <a:rPr lang="pl-PL" dirty="0"/>
+              <a:t> </a:t>
+            </a:r>
+            <a:r>
+              <a:rPr lang="pl-PL" dirty="0" err="1"/>
               <a:t>known</a:t>
             </a:r>
             <a:r>
-              <a:rPr lang="pl-PL"/>
-              <a:t> </a:t>
-            </a:r>
-            <a:r>
-              <a:rPr lang="pl-PL" err="1"/>
+              <a:rPr lang="pl-PL" dirty="0"/>
+              <a:t> </a:t>
+            </a:r>
+            <a:r>
+              <a:rPr lang="pl-PL" dirty="0" err="1"/>
               <a:t>beforehand</a:t>
             </a:r>
             <a:r>
-              <a:rPr lang="pl-PL"/>
+              <a:rPr lang="pl-PL" dirty="0"/>
               <a:t> </a:t>
             </a:r>
           </a:p>
           <a:p>
             <a:pPr lvl="1"/>
             <a:r>
-              <a:rPr lang="pl-PL"/>
+              <a:rPr lang="pl-PL" dirty="0"/>
               <a:t>59 to </a:t>
             </a:r>
             <a:r>
-              <a:rPr lang="pl-PL" err="1"/>
+              <a:rPr lang="pl-PL" dirty="0" err="1"/>
               <a:t>match</a:t>
             </a:r>
             <a:r>
-              <a:rPr lang="pl-PL"/>
+              <a:rPr lang="pl-PL" dirty="0"/>
               <a:t> the </a:t>
             </a:r>
             <a:r>
-              <a:rPr lang="pl-PL" err="1"/>
+              <a:rPr lang="pl-PL" dirty="0" err="1"/>
               <a:t>BERTopic</a:t>
             </a:r>
-            <a:endParaRPr lang="pl-PL"/>
+            <a:endParaRPr lang="pl-PL" dirty="0"/>
           </a:p>
           <a:p>
             <a:pPr marL="457200" lvl="1" indent="0">
               <a:buNone/>
             </a:pPr>
             <a:r>
-              <a:rPr lang="pl-PL"/>
+              <a:rPr lang="pl-PL" dirty="0"/>
               <a:t>		</a:t>
             </a:r>
           </a:p>
@@ -22703,7 +22596,7 @@
             <a:pPr marL="457200" lvl="1" indent="0">
               <a:buNone/>
             </a:pPr>
-            <a:endParaRPr lang="pl-PL"/>
+            <a:endParaRPr lang="pl-PL" dirty="0"/>
           </a:p>
         </p:txBody>
       </p:sp>
@@ -24097,37 +23990,37 @@
           <a:lstStyle/>
           <a:p>
             <a:r>
-              <a:rPr lang="pl-PL" err="1">
+              <a:rPr lang="pl-PL" dirty="0" err="1">
                 <a:cs typeface="Calibri"/>
               </a:rPr>
               <a:t>RESTapi</a:t>
             </a:r>
             <a:r>
-              <a:rPr lang="pl-PL">
+              <a:rPr lang="pl-PL" dirty="0">
                 <a:cs typeface="Calibri"/>
               </a:rPr>
               <a:t> </a:t>
             </a:r>
             <a:r>
-              <a:rPr lang="pl-PL" err="1">
+              <a:rPr lang="pl-PL" dirty="0" err="1">
                 <a:cs typeface="Calibri"/>
               </a:rPr>
               <a:t>communication</a:t>
             </a:r>
             <a:r>
-              <a:rPr lang="pl-PL">
+              <a:rPr lang="pl-PL" dirty="0">
                 <a:cs typeface="Calibri"/>
               </a:rPr>
               <a:t> (</a:t>
             </a:r>
             <a:r>
-              <a:rPr lang="pl-PL" err="1">
+              <a:rPr lang="pl-PL" dirty="0" err="1">
                 <a:cs typeface="Calibri"/>
               </a:rPr>
               <a:t>slow</a:t>
             </a:r>
             <a:r>
-              <a:rPr lang="pl-PL">
+              <a:rPr lang="pl-PL" dirty="0">
                 <a:cs typeface="Calibri"/>
               </a:rPr>
               <a:t>)</a:t>
@@ -24135,103 +24028,103 @@
           </a:p>
           <a:p>
             <a:r>
-              <a:rPr lang="pl-PL">
+              <a:rPr lang="pl-PL" dirty="0">
                 <a:cs typeface="Calibri"/>
               </a:rPr>
               <a:t>For </a:t>
             </a:r>
             <a:r>
-              <a:rPr lang="pl-PL" err="1">
+              <a:rPr lang="pl-PL" dirty="0" err="1">
                 <a:cs typeface="Calibri"/>
               </a:rPr>
               <a:t>each</a:t>
             </a:r>
             <a:r>
-              <a:rPr lang="pl-PL">
+              <a:rPr lang="pl-PL" dirty="0">
                 <a:cs typeface="Calibri"/>
               </a:rPr>
               <a:t> </a:t>
             </a:r>
             <a:r>
-              <a:rPr lang="pl-PL" err="1">
+              <a:rPr lang="pl-PL" dirty="0" err="1">
                 <a:cs typeface="Calibri"/>
               </a:rPr>
               <a:t>keword</a:t>
             </a:r>
             <a:r>
-              <a:rPr lang="pl-PL">
+              <a:rPr lang="pl-PL" dirty="0">
                 <a:cs typeface="Calibri"/>
               </a:rPr>
               <a:t> we </a:t>
             </a:r>
             <a:r>
-              <a:rPr lang="pl-PL" err="1">
+              <a:rPr lang="pl-PL" dirty="0" err="1">
                 <a:cs typeface="Calibri"/>
               </a:rPr>
               <a:t>match</a:t>
             </a:r>
             <a:r>
-              <a:rPr lang="pl-PL">
+              <a:rPr lang="pl-PL" dirty="0">
                 <a:cs typeface="Calibri"/>
               </a:rPr>
               <a:t> </a:t>
             </a:r>
             <a:r>
-              <a:rPr lang="pl-PL" err="1">
+              <a:rPr lang="pl-PL" dirty="0" err="1">
                 <a:cs typeface="Calibri"/>
               </a:rPr>
               <a:t>concept</a:t>
             </a:r>
             <a:r>
-              <a:rPr lang="pl-PL">
+              <a:rPr lang="pl-PL" dirty="0">
                 <a:cs typeface="Calibri"/>
               </a:rPr>
               <a:t> from </a:t>
             </a:r>
             <a:r>
-              <a:rPr lang="pl-PL" err="1">
+              <a:rPr lang="pl-PL" dirty="0" err="1">
                 <a:cs typeface="Calibri"/>
               </a:rPr>
               <a:t>ontology</a:t>
             </a:r>
             <a:r>
-              <a:rPr lang="pl-PL">
+              <a:rPr lang="pl-PL" dirty="0">
                 <a:cs typeface="Calibri"/>
               </a:rPr>
               <a:t> + </a:t>
             </a:r>
             <a:r>
-              <a:rPr lang="pl-PL" err="1">
+              <a:rPr lang="pl-PL" dirty="0" err="1">
                 <a:cs typeface="Calibri"/>
               </a:rPr>
               <a:t>take</a:t>
             </a:r>
             <a:r>
-              <a:rPr lang="pl-PL">
+              <a:rPr lang="pl-PL" dirty="0">
                 <a:cs typeface="Calibri"/>
               </a:rPr>
               <a:t> </a:t>
             </a:r>
             <a:r>
-              <a:rPr lang="pl-PL" err="1">
+              <a:rPr lang="pl-PL" dirty="0" err="1">
                 <a:cs typeface="Calibri"/>
               </a:rPr>
               <a:t>its</a:t>
             </a:r>
             <a:r>
-              <a:rPr lang="pl-PL">
+              <a:rPr lang="pl-PL" dirty="0">
                 <a:cs typeface="Calibri"/>
               </a:rPr>
               <a:t> </a:t>
             </a:r>
             <a:r>
-              <a:rPr lang="pl-PL" err="1">
+              <a:rPr lang="pl-PL" dirty="0" err="1">
                 <a:cs typeface="Calibri"/>
               </a:rPr>
               <a:t>ancestors</a:t>
             </a:r>
             <a:r>
-              <a:rPr lang="pl-PL">
+              <a:rPr lang="pl-PL" dirty="0">
                 <a:cs typeface="Calibri"/>
               </a:rPr>
               <a:t> in hierarchy</a:t>
@@ -24239,249 +24132,228 @@
           </a:p>
           <a:p>
             <a:r>
-              <a:rPr lang="pl-PL" err="1">
+              <a:rPr lang="pl-PL" dirty="0" err="1">
                 <a:cs typeface="Calibri"/>
               </a:rPr>
               <a:t>Taking</a:t>
             </a:r>
             <a:r>
-              <a:rPr lang="pl-PL">
+              <a:rPr lang="pl-PL" dirty="0">
                 <a:cs typeface="Calibri"/>
               </a:rPr>
               <a:t> </a:t>
             </a:r>
             <a:r>
-              <a:rPr lang="pl-PL" err="1">
+              <a:rPr lang="pl-PL" dirty="0" err="1">
                 <a:cs typeface="Calibri"/>
               </a:rPr>
               <a:t>into</a:t>
             </a:r>
             <a:r>
-              <a:rPr lang="pl-PL">
+              <a:rPr lang="pl-PL" dirty="0">
                 <a:cs typeface="Calibri"/>
               </a:rPr>
               <a:t> </a:t>
             </a:r>
             <a:r>
-              <a:rPr lang="pl-PL" err="1">
+              <a:rPr lang="pl-PL" dirty="0" err="1">
                 <a:cs typeface="Calibri"/>
               </a:rPr>
               <a:t>account</a:t>
             </a:r>
             <a:r>
-              <a:rPr lang="pl-PL">
+              <a:rPr lang="pl-PL" dirty="0">
                 <a:cs typeface="Calibri"/>
               </a:rPr>
-              <a:t> 18 </a:t>
-            </a:r>
-            <a:r>
-              <a:rPr lang="pl-PL" err="1">
+              <a:t> 18 ontologies </a:t>
+            </a:r>
+            <a:r>
+              <a:rPr lang="pl-PL" dirty="0" err="1">
                 <a:cs typeface="Calibri"/>
               </a:rPr>
-              <a:t>ontologies</a:t>
-            </a:r>
-            <a:r>
-              <a:rPr lang="pl-PL">
+              <a:t>included</a:t>
+            </a:r>
+            <a:r>
+              <a:rPr lang="pl-PL" dirty="0">
                 <a:cs typeface="Calibri"/>
               </a:rPr>
+              <a:t> in MedMentions ST21pv </a:t>
+            </a:r>
+            <a:r>
+              <a:rPr lang="pl-PL" dirty="0" err="1">
+                <a:cs typeface="Calibri"/>
+              </a:rPr>
+              <a:t>dataset</a:t>
+            </a:r>
+            <a:endParaRPr lang="pl-PL" dirty="0">
+              <a:cs typeface="Calibri"/>
+            </a:endParaRPr>
+          </a:p>
+          <a:p>
+            <a:r>
+              <a:rPr lang="pl-PL" dirty="0" err="1">
+                <a:cs typeface="Calibri"/>
+              </a:rPr>
+              <a:t>Testing</a:t>
+            </a:r>
+            <a:r>
+              <a:rPr lang="pl-PL" dirty="0">
+                <a:cs typeface="Calibri"/>
+              </a:rPr>
               <a:t> </a:t>
             </a:r>
             <a:r>
-              <a:rPr lang="pl-PL" err="1">
+              <a:rPr lang="pl-PL" dirty="0" err="1">
                 <a:cs typeface="Calibri"/>
               </a:rPr>
-              <a:t>included</a:t>
-            </a:r>
-            <a:r>
-              <a:rPr lang="pl-PL">
+              <a:t>two</a:t>
+            </a:r>
+            <a:r>
+              <a:rPr lang="pl-PL" dirty="0">
                 <a:cs typeface="Calibri"/>
               </a:rPr>
-              <a:t> in </a:t>
-            </a:r>
-            <a:r>
-              <a:rPr lang="pl-PL" err="1">
+              <a:t> </a:t>
+            </a:r>
+            <a:r>
+              <a:rPr lang="pl-PL" dirty="0" err="1">
                 <a:cs typeface="Calibri"/>
               </a:rPr>
-              <a:t>MedMentions</a:t>
-            </a:r>
-            <a:r>
-              <a:rPr lang="pl-PL">
+              <a:t>approaches</a:t>
+            </a:r>
+            <a:r>
+              <a:rPr lang="pl-PL" dirty="0">
                 <a:cs typeface="Calibri"/>
               </a:rPr>
-              <a:t> ST21pv </a:t>
-            </a:r>
-            <a:r>
-              <a:rPr lang="pl-PL" err="1">
+              <a:t> </a:t>
+            </a:r>
+            <a:r>
+              <a:rPr lang="pl-PL" dirty="0" err="1">
                 <a:cs typeface="Calibri"/>
               </a:rPr>
-              <a:t>dataset</a:t>
-            </a:r>
-          </a:p>
-          <a:p>
-            <a:r>
-              <a:rPr lang="pl-PL" err="1">
+              <a:t>reagrding</a:t>
+            </a:r>
+            <a:r>
+              <a:rPr lang="pl-PL" dirty="0">
                 <a:cs typeface="Calibri"/>
               </a:rPr>
-              <a:t>Testing</a:t>
-            </a:r>
-            <a:r>
-              <a:rPr lang="pl-PL">
+              <a:t> </a:t>
+            </a:r>
+            <a:r>
+              <a:rPr lang="pl-PL" dirty="0" err="1">
                 <a:cs typeface="Calibri"/>
               </a:rPr>
-              <a:t> </a:t>
-            </a:r>
-            <a:r>
-              <a:rPr lang="pl-PL" err="1">
+              <a:t>semantic</a:t>
+            </a:r>
+            <a:r>
+              <a:rPr lang="pl-PL" dirty="0">
                 <a:cs typeface="Calibri"/>
               </a:rPr>
-              <a:t>two</a:t>
-            </a:r>
-            <a:r>
-              <a:rPr lang="pl-PL">
+              <a:t> </a:t>
+            </a:r>
+            <a:r>
+              <a:rPr lang="pl-PL" dirty="0" err="1">
                 <a:cs typeface="Calibri"/>
               </a:rPr>
-              <a:t> </a:t>
-            </a:r>
-            <a:r>
-              <a:rPr lang="pl-PL" err="1">
+              <a:t>types</a:t>
+            </a:r>
+            <a:r>
+              <a:rPr lang="pl-PL" dirty="0">
                 <a:cs typeface="Calibri"/>
               </a:rPr>
-              <a:t>approaches</a:t>
-            </a:r>
-            <a:r>
-              <a:rPr lang="pl-PL">
+              <a:t>: </a:t>
+            </a:r>
+            <a:r>
+              <a:rPr lang="pl-PL" dirty="0" err="1">
                 <a:cs typeface="Calibri"/>
               </a:rPr>
-              <a:t> </a:t>
-            </a:r>
-            <a:r>
-              <a:rPr lang="pl-PL" err="1">
+              <a:t>including</a:t>
+            </a:r>
+            <a:r>
+              <a:rPr lang="pl-PL" dirty="0">
                 <a:cs typeface="Calibri"/>
               </a:rPr>
-              <a:t>reagrding</a:t>
-            </a:r>
-            <a:r>
-              <a:rPr lang="pl-PL">
+              <a:t> </a:t>
+            </a:r>
+            <a:r>
+              <a:rPr lang="pl-PL" dirty="0" err="1">
                 <a:cs typeface="Calibri"/>
               </a:rPr>
-              <a:t> </a:t>
-            </a:r>
-            <a:r>
-              <a:rPr lang="pl-PL" err="1">
+              <a:t>all</a:t>
+            </a:r>
+            <a:r>
+              <a:rPr lang="pl-PL" dirty="0">
                 <a:cs typeface="Calibri"/>
               </a:rPr>
+              <a:t> </a:t>
+            </a:r>
+            <a:r>
+              <a:rPr lang="pl-PL" dirty="0" err="1">
+                <a:cs typeface="Calibri"/>
+              </a:rPr>
+              <a:t>smeantic</a:t>
+            </a:r>
+            <a:r>
+              <a:rPr lang="pl-PL" dirty="0">
+                <a:cs typeface="Calibri"/>
+              </a:rPr>
+              <a:t> </a:t>
+            </a:r>
+            <a:r>
+              <a:rPr lang="pl-PL" dirty="0" err="1">
+                <a:cs typeface="Calibri"/>
+              </a:rPr>
+              <a:t>types</a:t>
+            </a:r>
+            <a:r>
+              <a:rPr lang="pl-PL" dirty="0">
+                <a:cs typeface="Calibri"/>
+              </a:rPr>
+              <a:t> and </a:t>
+            </a:r>
+            <a:r>
+              <a:rPr lang="pl-PL" dirty="0" err="1">
+                <a:cs typeface="Calibri"/>
+              </a:rPr>
+              <a:t>including</a:t>
+            </a:r>
+            <a:r>
+              <a:rPr lang="pl-PL" dirty="0">
+                <a:cs typeface="Calibri"/>
+              </a:rPr>
+              <a:t> </a:t>
+            </a:r>
+            <a:r>
+              <a:rPr lang="pl-PL" dirty="0" err="1">
+                <a:cs typeface="Calibri"/>
+              </a:rPr>
+              <a:t>only</a:t>
+            </a:r>
+            <a:r>
+              <a:rPr lang="pl-PL" dirty="0">
+                <a:cs typeface="Calibri"/>
+              </a:rPr>
+              <a:t> 21 ST21pv </a:t>
+            </a:r>
+            <a:r>
+              <a:rPr lang="pl-PL" dirty="0" err="1">
+                <a:cs typeface="Calibri"/>
+              </a:rPr>
               <a:t>semantic</a:t>
             </a:r>
             <a:r>
-              <a:rPr lang="pl-PL">
+              <a:rPr lang="pl-PL" dirty="0">
                 <a:cs typeface="Calibri"/>
               </a:rPr>
               <a:t> </a:t>
             </a:r>
             <a:r>
-              <a:rPr lang="pl-PL" err="1">
+              <a:rPr lang="pl-PL" dirty="0" err="1">
                 <a:cs typeface="Calibri"/>
               </a:rPr>
               <a:t>types</a:t>
             </a:r>
             <a:r>
-              <a:rPr lang="pl-PL">
-                <a:cs typeface="Calibri"/>
-              </a:rPr>
-              <a:t>: </a:t>
-            </a:r>
-            <a:r>
-              <a:rPr lang="pl-PL" err="1">
-                <a:cs typeface="Calibri"/>
-              </a:rPr>
-              <a:t>including</a:t>
-            </a:r>
-            <a:r>
-              <a:rPr lang="pl-PL">
-                <a:cs typeface="Calibri"/>
-              </a:rPr>
-              <a:t> </a:t>
-            </a:r>
-            <a:r>
-              <a:rPr lang="pl-PL" err="1">
-                <a:cs typeface="Calibri"/>
-              </a:rPr>
-              <a:t>all</a:t>
-            </a:r>
-            <a:r>
-              <a:rPr lang="pl-PL">
-                <a:cs typeface="Calibri"/>
-              </a:rPr>
-              <a:t> </a:t>
-            </a:r>
-            <a:r>
-              <a:rPr lang="pl-PL" err="1">
-                <a:cs typeface="Calibri"/>
-              </a:rPr>
-              <a:t>smeantic</a:t>
-            </a:r>
-            <a:r>
-              <a:rPr lang="pl-PL">
-                <a:cs typeface="Calibri"/>
-              </a:rPr>
-              <a:t> </a:t>
-            </a:r>
-            <a:r>
-              <a:rPr lang="pl-PL" err="1">
-                <a:cs typeface="Calibri"/>
-              </a:rPr>
-              <a:t>types</a:t>
-            </a:r>
-            <a:r>
-              <a:rPr lang="pl-PL">
-                <a:cs typeface="Calibri"/>
-              </a:rPr>
-              <a:t> and </a:t>
-            </a:r>
-            <a:r>
-              <a:rPr lang="pl-PL" err="1">
-                <a:cs typeface="Calibri"/>
-              </a:rPr>
-              <a:t>including</a:t>
-            </a:r>
-            <a:r>
-              <a:rPr lang="pl-PL">
-                <a:cs typeface="Calibri"/>
-              </a:rPr>
-              <a:t> </a:t>
-            </a:r>
-            <a:r>
-              <a:rPr lang="pl-PL" err="1">
-                <a:cs typeface="Calibri"/>
-              </a:rPr>
-              <a:t>only</a:t>
-            </a:r>
-            <a:r>
-              <a:rPr lang="pl-PL">
-                <a:cs typeface="Calibri"/>
-              </a:rPr>
-              <a:t> 21 ST21pv </a:t>
-            </a:r>
-            <a:r>
-              <a:rPr lang="pl-PL" err="1">
-                <a:cs typeface="Calibri"/>
-              </a:rPr>
-              <a:t>semantic</a:t>
-            </a:r>
-            <a:r>
-              <a:rPr lang="pl-PL">
-                <a:cs typeface="Calibri"/>
-              </a:rPr>
-              <a:t> </a:t>
-            </a:r>
-            <a:r>
-              <a:rPr lang="pl-PL" err="1">
-                <a:cs typeface="Calibri"/>
-              </a:rPr>
-              <a:t>types</a:t>
-            </a:r>
-            <a:r>
-              <a:rPr lang="pl-PL">
+              <a:rPr lang="pl-PL" dirty="0">
                 <a:cs typeface="Calibri"/>
               </a:rPr>
               <a:t> </a:t>
@@ -25845,6 +25717,15 @@
 </file>
 
 <file path=customXml/item2.xml><?xml version="1.0" encoding="utf-8"?>
+<?mso-contentType ?>
+<FormTemplates xmlns="http://schemas.microsoft.com/sharepoint/v3/contenttype/forms">
+  <Display>DocumentLibraryForm</Display>
+  <Edit>DocumentLibraryForm</Edit>
+  <New>DocumentLibraryForm</New>
+</FormTemplates>
+</file>
+
+<file path=customXml/item3.xml><?xml version="1.0" encoding="utf-8"?>
 <ct:contentTypeSchema xmlns:ct="http://schemas.microsoft.com/office/2006/metadata/contentType" xmlns:ma="http://schemas.microsoft.com/office/2006/metadata/properties/metaAttributes" ct:_="" ma:_="" ma:contentTypeName="Dokument" ma:contentTypeID="0x01010072436DB212989045842B6E0DA8D69116" ma:contentTypeVersion="12" ma:contentTypeDescription="Utwórz nowy dokument." ma:contentTypeScope="" ma:versionID="e102afbef97c9d1481fc53b8caf9291e">
   <xsd:schema xmlns:xsd="http://www.w3.org/2001/XMLSchema" xmlns:xs="http://www.w3.org/2001/XMLSchema" xmlns:p="http://schemas.microsoft.com/office/2006/metadata/properties" xmlns:ns3="cf935a04-1105-44b2-8e35-52ed1962f88a" xmlns:ns4="3bc08efe-0735-408f-a57e-74cc17362593" targetNamespace="http://schemas.microsoft.com/office/2006/metadata/properties" ma:root="true" ma:fieldsID="567a91598a37b6a5e2b72acbea866bc3" ns3:_="" ns4:_="">
     <xsd:import namespace="cf935a04-1105-44b2-8e35-52ed1962f88a"/>
@@ -26059,15 +25940,6 @@
 </ct:contentTypeSchema>
 </file>
 
-<file path=customXml/item3.xml><?xml version="1.0" encoding="utf-8"?>
-<?mso-contentType ?>
-<FormTemplates xmlns="http://schemas.microsoft.com/sharepoint/v3/contenttype/forms">
-  <Display>DocumentLibraryForm</Display>
-  <Edit>DocumentLibraryForm</Edit>
-  <New>DocumentLibraryForm</New>
-</FormTemplates>
-</file>
-
 <file path=customXml/itemProps1.xml><?xml version="1.0" encoding="utf-8"?>
 <ds:datastoreItem xmlns:ds="http://schemas.openxmlformats.org/officeDocument/2006/customXml" ds:itemID="{77F53A6B-508B-46A8-BA4C-A5610B06480E}">
   <ds:schemaRefs>
@@ -26086,6 +25958,14 @@
 </file>
 
 <file path=customXml/itemProps2.xml><?xml version="1.0" encoding="utf-8"?>
+<ds:datastoreItem xmlns:ds="http://schemas.openxmlformats.org/officeDocument/2006/customXml" ds:itemID="{E2B0209F-CA15-4BE6-9C73-875B6BCE7543}">
+  <ds:schemaRefs>
+    <ds:schemaRef ds:uri="http://schemas.microsoft.com/sharepoint/v3/contenttype/forms"/>
+  </ds:schemaRefs>
+</ds:datastoreItem>
+</file>
+
+<file path=customXml/itemProps3.xml><?xml version="1.0" encoding="utf-8"?>
 <ds:datastoreItem xmlns:ds="http://schemas.openxmlformats.org/officeDocument/2006/customXml" ds:itemID="{BED10F06-1BC2-4CB2-9C4A-718FE9966D44}">
   <ds:schemaRefs>
     <ds:schemaRef ds:uri="3bc08efe-0735-408f-a57e-74cc17362593"/>
@@ -26102,12 +25982,4 @@
     <ds:schemaRef ds:uri="http://www.w3.org/2001/XMLSchema"/>
   </ds:schemaRefs>
 </ds:datastoreItem>
-</file>
-
-<file path=customXml/itemProps3.xml><?xml version="1.0" encoding="utf-8"?>
-<ds:datastoreItem xmlns:ds="http://schemas.openxmlformats.org/officeDocument/2006/customXml" ds:itemID="{E2B0209F-CA15-4BE6-9C73-875B6BCE7543}">
-  <ds:schemaRefs>
-    <ds:schemaRef ds:uri="http://schemas.microsoft.com/sharepoint/v3/contenttype/forms"/>
-  </ds:schemaRefs>
-</ds:datastoreItem>
 </file>
</xml_diff>